<commit_message>
Added pictures to the presentation
</commit_message>
<xml_diff>
--- a/documentation/Presentation.pptx
+++ b/documentation/Presentation.pptx
@@ -266,7 +266,7 @@
           <a:p>
             <a:fld id="{4EA6F7CB-6E4F-4A5C-968B-0CED0D949821}" type="datetimeFigureOut">
               <a:rPr lang="en-AS" smtClean="0"/>
-              <a:t>5/8/2025</a:t>
+              <a:t>5/11/2025</a:t>
             </a:fld>
             <a:endParaRPr lang="en-AS"/>
           </a:p>
@@ -466,7 +466,7 @@
           <a:p>
             <a:fld id="{4EA6F7CB-6E4F-4A5C-968B-0CED0D949821}" type="datetimeFigureOut">
               <a:rPr lang="en-AS" smtClean="0"/>
-              <a:t>5/8/2025</a:t>
+              <a:t>5/11/2025</a:t>
             </a:fld>
             <a:endParaRPr lang="en-AS"/>
           </a:p>
@@ -676,7 +676,7 @@
           <a:p>
             <a:fld id="{4EA6F7CB-6E4F-4A5C-968B-0CED0D949821}" type="datetimeFigureOut">
               <a:rPr lang="en-AS" smtClean="0"/>
-              <a:t>5/8/2025</a:t>
+              <a:t>5/11/2025</a:t>
             </a:fld>
             <a:endParaRPr lang="en-AS"/>
           </a:p>
@@ -876,7 +876,7 @@
           <a:p>
             <a:fld id="{4EA6F7CB-6E4F-4A5C-968B-0CED0D949821}" type="datetimeFigureOut">
               <a:rPr lang="en-AS" smtClean="0"/>
-              <a:t>5/8/2025</a:t>
+              <a:t>5/11/2025</a:t>
             </a:fld>
             <a:endParaRPr lang="en-AS"/>
           </a:p>
@@ -1152,7 +1152,7 @@
           <a:p>
             <a:fld id="{4EA6F7CB-6E4F-4A5C-968B-0CED0D949821}" type="datetimeFigureOut">
               <a:rPr lang="en-AS" smtClean="0"/>
-              <a:t>5/8/2025</a:t>
+              <a:t>5/11/2025</a:t>
             </a:fld>
             <a:endParaRPr lang="en-AS"/>
           </a:p>
@@ -1420,7 +1420,7 @@
           <a:p>
             <a:fld id="{4EA6F7CB-6E4F-4A5C-968B-0CED0D949821}" type="datetimeFigureOut">
               <a:rPr lang="en-AS" smtClean="0"/>
-              <a:t>5/8/2025</a:t>
+              <a:t>5/11/2025</a:t>
             </a:fld>
             <a:endParaRPr lang="en-AS"/>
           </a:p>
@@ -1835,7 +1835,7 @@
           <a:p>
             <a:fld id="{4EA6F7CB-6E4F-4A5C-968B-0CED0D949821}" type="datetimeFigureOut">
               <a:rPr lang="en-AS" smtClean="0"/>
-              <a:t>5/8/2025</a:t>
+              <a:t>5/11/2025</a:t>
             </a:fld>
             <a:endParaRPr lang="en-AS"/>
           </a:p>
@@ -1977,7 +1977,7 @@
           <a:p>
             <a:fld id="{4EA6F7CB-6E4F-4A5C-968B-0CED0D949821}" type="datetimeFigureOut">
               <a:rPr lang="en-AS" smtClean="0"/>
-              <a:t>5/8/2025</a:t>
+              <a:t>5/11/2025</a:t>
             </a:fld>
             <a:endParaRPr lang="en-AS"/>
           </a:p>
@@ -2090,7 +2090,7 @@
           <a:p>
             <a:fld id="{4EA6F7CB-6E4F-4A5C-968B-0CED0D949821}" type="datetimeFigureOut">
               <a:rPr lang="en-AS" smtClean="0"/>
-              <a:t>5/8/2025</a:t>
+              <a:t>5/11/2025</a:t>
             </a:fld>
             <a:endParaRPr lang="en-AS"/>
           </a:p>
@@ -2403,7 +2403,7 @@
           <a:p>
             <a:fld id="{4EA6F7CB-6E4F-4A5C-968B-0CED0D949821}" type="datetimeFigureOut">
               <a:rPr lang="en-AS" smtClean="0"/>
-              <a:t>5/8/2025</a:t>
+              <a:t>5/11/2025</a:t>
             </a:fld>
             <a:endParaRPr lang="en-AS"/>
           </a:p>
@@ -2696,7 +2696,7 @@
           <a:p>
             <a:fld id="{4EA6F7CB-6E4F-4A5C-968B-0CED0D949821}" type="datetimeFigureOut">
               <a:rPr lang="en-AS" smtClean="0"/>
-              <a:t>5/8/2025</a:t>
+              <a:t>5/11/2025</a:t>
             </a:fld>
             <a:endParaRPr lang="en-AS"/>
           </a:p>
@@ -2939,7 +2939,7 @@
           <a:p>
             <a:fld id="{4EA6F7CB-6E4F-4A5C-968B-0CED0D949821}" type="datetimeFigureOut">
               <a:rPr lang="en-AS" smtClean="0"/>
-              <a:t>5/8/2025</a:t>
+              <a:t>5/11/2025</a:t>
             </a:fld>
             <a:endParaRPr lang="en-AS"/>
           </a:p>
@@ -16957,7 +16957,7 @@
         </p:nvSpPr>
         <p:spPr>
           <a:xfrm>
-            <a:off x="4953784" y="2155730"/>
+            <a:off x="4953783" y="2236286"/>
             <a:ext cx="2234153" cy="369332"/>
           </a:xfrm>
           <a:prstGeom prst="rect">
@@ -17110,7 +17110,7 @@
         </p:nvSpPr>
         <p:spPr>
           <a:xfrm>
-            <a:off x="4907461" y="505676"/>
+            <a:off x="4907459" y="375573"/>
             <a:ext cx="2377077" cy="400110"/>
           </a:xfrm>
           <a:prstGeom prst="rect">
@@ -17361,6 +17361,90 @@
           </a:p>
         </p:txBody>
       </p:sp>
+      <p:pic>
+        <p:nvPicPr>
+          <p:cNvPr id="4" name="Picture 3" descr="A child in a blue and grey jacket&#10;&#10;AI-generated content may be incorrect.">
+            <a:extLst>
+              <a:ext uri="{FF2B5EF4-FFF2-40B4-BE49-F238E27FC236}">
+                <a16:creationId xmlns:a16="http://schemas.microsoft.com/office/drawing/2014/main" id="{39BE88B5-EE00-92E1-A0C8-74C8E12C0BBA}"/>
+              </a:ext>
+            </a:extLst>
+          </p:cNvPr>
+          <p:cNvPicPr>
+            <a:picLocks noChangeAspect="1"/>
+          </p:cNvPicPr>
+          <p:nvPr/>
+        </p:nvPicPr>
+        <p:blipFill>
+          <a:blip r:embed="rId4">
+            <a:extLst>
+              <a:ext uri="{28A0092B-C50C-407E-A947-70E740481C1C}">
+                <a14:useLocalDpi xmlns:a14="http://schemas.microsoft.com/office/drawing/2010/main" val="0"/>
+              </a:ext>
+            </a:extLst>
+          </a:blip>
+          <a:stretch>
+            <a:fillRect/>
+          </a:stretch>
+        </p:blipFill>
+        <p:spPr>
+          <a:xfrm>
+            <a:off x="5239483" y="724520"/>
+            <a:ext cx="1662755" cy="1639001"/>
+          </a:xfrm>
+          <a:prstGeom prst="ellipse">
+            <a:avLst/>
+          </a:prstGeom>
+          <a:ln>
+            <a:noFill/>
+          </a:ln>
+          <a:effectLst>
+            <a:softEdge rad="112500"/>
+          </a:effectLst>
+        </p:spPr>
+      </p:pic>
+      <p:pic>
+        <p:nvPicPr>
+          <p:cNvPr id="10" name="Picture 9" descr="A child in a white shirt&#10;&#10;AI-generated content may be incorrect.">
+            <a:extLst>
+              <a:ext uri="{FF2B5EF4-FFF2-40B4-BE49-F238E27FC236}">
+                <a16:creationId xmlns:a16="http://schemas.microsoft.com/office/drawing/2014/main" id="{66E0808D-7195-EC1B-E7C2-EBEF1833BA78}"/>
+              </a:ext>
+            </a:extLst>
+          </p:cNvPr>
+          <p:cNvPicPr>
+            <a:picLocks noChangeAspect="1"/>
+          </p:cNvPicPr>
+          <p:nvPr/>
+        </p:nvPicPr>
+        <p:blipFill>
+          <a:blip r:embed="rId5">
+            <a:extLst>
+              <a:ext uri="{28A0092B-C50C-407E-A947-70E740481C1C}">
+                <a14:useLocalDpi xmlns:a14="http://schemas.microsoft.com/office/drawing/2010/main" val="0"/>
+              </a:ext>
+            </a:extLst>
+          </a:blip>
+          <a:stretch>
+            <a:fillRect/>
+          </a:stretch>
+        </p:blipFill>
+        <p:spPr>
+          <a:xfrm>
+            <a:off x="8863214" y="822630"/>
+            <a:ext cx="1442780" cy="1442780"/>
+          </a:xfrm>
+          <a:prstGeom prst="ellipse">
+            <a:avLst/>
+          </a:prstGeom>
+          <a:ln>
+            <a:noFill/>
+          </a:ln>
+          <a:effectLst>
+            <a:softEdge rad="112500"/>
+          </a:effectLst>
+        </p:spPr>
+      </p:pic>
     </p:spTree>
     <p:extLst>
       <p:ext uri="{BB962C8B-B14F-4D97-AF65-F5344CB8AC3E}">
@@ -35770,6 +35854,14 @@
 </file>
 
 <file path=customXml/item2.xml><?xml version="1.0" encoding="utf-8"?>
+<p:properties xmlns:p="http://schemas.microsoft.com/office/2006/metadata/properties" xmlns:xsi="http://www.w3.org/2001/XMLSchema-instance" xmlns:pc="http://schemas.microsoft.com/office/infopath/2007/PartnerControls">
+  <documentManagement>
+    <_activity xmlns="0abcd5ae-8ee0-47d4-a59a-00240398246c" xsi:nil="true"/>
+  </documentManagement>
+</p:properties>
+</file>
+
+<file path=customXml/item3.xml><?xml version="1.0" encoding="utf-8"?>
 <ct:contentTypeSchema xmlns:ct="http://schemas.microsoft.com/office/2006/metadata/contentType" xmlns:ma="http://schemas.microsoft.com/office/2006/metadata/properties/metaAttributes" ct:_="" ma:_="" ma:contentTypeName="Document" ma:contentTypeID="0x0101000AC29F5E522E95488674DF393038BD99" ma:contentTypeVersion="8" ma:contentTypeDescription="Create a new document." ma:contentTypeScope="" ma:versionID="c971bdd218ba9101507c33cc582fe21c">
   <xsd:schema xmlns:xsd="http://www.w3.org/2001/XMLSchema" xmlns:xs="http://www.w3.org/2001/XMLSchema" xmlns:p="http://schemas.microsoft.com/office/2006/metadata/properties" xmlns:ns3="0abcd5ae-8ee0-47d4-a59a-00240398246c" xmlns:ns4="fc9ab629-8c1e-4e9f-a27d-21af9543d17f" targetNamespace="http://schemas.microsoft.com/office/2006/metadata/properties" ma:root="true" ma:fieldsID="094da82251913ddf886ea8a6050ea058" ns3:_="" ns4:_="">
     <xsd:import namespace="0abcd5ae-8ee0-47d4-a59a-00240398246c"/>
@@ -35958,14 +36050,6 @@
 </ct:contentTypeSchema>
 </file>
 
-<file path=customXml/item3.xml><?xml version="1.0" encoding="utf-8"?>
-<p:properties xmlns:p="http://schemas.microsoft.com/office/2006/metadata/properties" xmlns:xsi="http://www.w3.org/2001/XMLSchema-instance" xmlns:pc="http://schemas.microsoft.com/office/infopath/2007/PartnerControls">
-  <documentManagement>
-    <_activity xmlns="0abcd5ae-8ee0-47d4-a59a-00240398246c" xsi:nil="true"/>
-  </documentManagement>
-</p:properties>
-</file>
-
 <file path=customXml/itemProps1.xml><?xml version="1.0" encoding="utf-8"?>
 <ds:datastoreItem xmlns:ds="http://schemas.openxmlformats.org/officeDocument/2006/customXml" ds:itemID="{7ED4AF3E-9DCC-4D14-9582-5516E789E05E}">
   <ds:schemaRefs>
@@ -35975,6 +36059,23 @@
 </file>
 
 <file path=customXml/itemProps2.xml><?xml version="1.0" encoding="utf-8"?>
+<ds:datastoreItem xmlns:ds="http://schemas.openxmlformats.org/officeDocument/2006/customXml" ds:itemID="{048E1343-CD6C-4CFD-B13D-83861E52DF5B}">
+  <ds:schemaRefs>
+    <ds:schemaRef ds:uri="http://schemas.microsoft.com/office/2006/metadata/properties"/>
+    <ds:schemaRef ds:uri="http://schemas.microsoft.com/office/2006/documentManagement/types"/>
+    <ds:schemaRef ds:uri="0abcd5ae-8ee0-47d4-a59a-00240398246c"/>
+    <ds:schemaRef ds:uri="http://purl.org/dc/elements/1.1/"/>
+    <ds:schemaRef ds:uri="http://schemas.openxmlformats.org/package/2006/metadata/core-properties"/>
+    <ds:schemaRef ds:uri="fc9ab629-8c1e-4e9f-a27d-21af9543d17f"/>
+    <ds:schemaRef ds:uri="http://schemas.microsoft.com/office/infopath/2007/PartnerControls"/>
+    <ds:schemaRef ds:uri="http://www.w3.org/XML/1998/namespace"/>
+    <ds:schemaRef ds:uri="http://purl.org/dc/dcmitype/"/>
+    <ds:schemaRef ds:uri="http://purl.org/dc/terms/"/>
+  </ds:schemaRefs>
+</ds:datastoreItem>
+</file>
+
+<file path=customXml/itemProps3.xml><?xml version="1.0" encoding="utf-8"?>
 <ds:datastoreItem xmlns:ds="http://schemas.openxmlformats.org/officeDocument/2006/customXml" ds:itemID="{B0139F82-E3AA-44C2-B504-75EB3DAFD4D9}">
   <ds:schemaRefs>
     <ds:schemaRef ds:uri="http://schemas.microsoft.com/office/2006/metadata/contentType"/>
@@ -35991,21 +36092,4 @@
     <ds:schemaRef ds:uri="http://schemas.microsoft.com/internal/obd"/>
   </ds:schemaRefs>
 </ds:datastoreItem>
-</file>
-
-<file path=customXml/itemProps3.xml><?xml version="1.0" encoding="utf-8"?>
-<ds:datastoreItem xmlns:ds="http://schemas.openxmlformats.org/officeDocument/2006/customXml" ds:itemID="{048E1343-CD6C-4CFD-B13D-83861E52DF5B}">
-  <ds:schemaRefs>
-    <ds:schemaRef ds:uri="http://schemas.microsoft.com/office/2006/metadata/properties"/>
-    <ds:schemaRef ds:uri="http://schemas.microsoft.com/office/2006/documentManagement/types"/>
-    <ds:schemaRef ds:uri="0abcd5ae-8ee0-47d4-a59a-00240398246c"/>
-    <ds:schemaRef ds:uri="http://purl.org/dc/elements/1.1/"/>
-    <ds:schemaRef ds:uri="http://schemas.openxmlformats.org/package/2006/metadata/core-properties"/>
-    <ds:schemaRef ds:uri="fc9ab629-8c1e-4e9f-a27d-21af9543d17f"/>
-    <ds:schemaRef ds:uri="http://schemas.microsoft.com/office/infopath/2007/PartnerControls"/>
-    <ds:schemaRef ds:uri="http://www.w3.org/XML/1998/namespace"/>
-    <ds:schemaRef ds:uri="http://purl.org/dc/dcmitype/"/>
-    <ds:schemaRef ds:uri="http://purl.org/dc/terms/"/>
-  </ds:schemaRefs>
-</ds:datastoreItem>
 </file>
</xml_diff>

<commit_message>
added pictures to the presentation nad edited some text animations
</commit_message>
<xml_diff>
--- a/documentation/Presentation.pptx
+++ b/documentation/Presentation.pptx
@@ -17445,6 +17445,48 @@
           </a:effectLst>
         </p:spPr>
       </p:pic>
+      <p:pic>
+        <p:nvPicPr>
+          <p:cNvPr id="8" name="Picture 7" descr="A person wearing glasses and a white shirt">
+            <a:extLst>
+              <a:ext uri="{FF2B5EF4-FFF2-40B4-BE49-F238E27FC236}">
+                <a16:creationId xmlns:a16="http://schemas.microsoft.com/office/drawing/2014/main" id="{F53B52C9-D312-0D20-468C-92C2C15B2B81}"/>
+              </a:ext>
+            </a:extLst>
+          </p:cNvPr>
+          <p:cNvPicPr>
+            <a:picLocks noChangeAspect="1"/>
+          </p:cNvPicPr>
+          <p:nvPr/>
+        </p:nvPicPr>
+        <p:blipFill>
+          <a:blip r:embed="rId6">
+            <a:extLst>
+              <a:ext uri="{28A0092B-C50C-407E-A947-70E740481C1C}">
+                <a14:useLocalDpi xmlns:a14="http://schemas.microsoft.com/office/drawing/2010/main" val="0"/>
+              </a:ext>
+            </a:extLst>
+          </a:blip>
+          <a:stretch>
+            <a:fillRect/>
+          </a:stretch>
+        </p:blipFill>
+        <p:spPr>
+          <a:xfrm>
+            <a:off x="8968390" y="2847959"/>
+            <a:ext cx="1535609" cy="2729971"/>
+          </a:xfrm>
+          <a:prstGeom prst="rect">
+            <a:avLst/>
+          </a:prstGeom>
+          <a:ln>
+            <a:noFill/>
+          </a:ln>
+          <a:effectLst>
+            <a:softEdge rad="112500"/>
+          </a:effectLst>
+        </p:spPr>
+      </p:pic>
     </p:spTree>
     <p:extLst>
       <p:ext uri="{BB962C8B-B14F-4D97-AF65-F5344CB8AC3E}">
@@ -22039,644 +22081,6 @@
       </p:transition>
     </mc:Fallback>
   </mc:AlternateContent>
-  <p:timing>
-    <p:tnLst>
-      <p:par>
-        <p:cTn id="1" dur="indefinite" restart="never" nodeType="tmRoot">
-          <p:childTnLst>
-            <p:seq concurrent="1" nextAc="seek">
-              <p:cTn id="2" dur="indefinite" nodeType="mainSeq">
-                <p:childTnLst>
-                  <p:par>
-                    <p:cTn id="3" fill="hold">
-                      <p:stCondLst>
-                        <p:cond delay="indefinite"/>
-                      </p:stCondLst>
-                      <p:childTnLst>
-                        <p:par>
-                          <p:cTn id="4" fill="hold">
-                            <p:stCondLst>
-                              <p:cond delay="0"/>
-                            </p:stCondLst>
-                            <p:childTnLst>
-                              <p:par>
-                                <p:cTn id="5" presetID="26" presetClass="exit" presetSubtype="0" fill="hold" nodeType="clickEffect">
-                                  <p:stCondLst>
-                                    <p:cond delay="0"/>
-                                  </p:stCondLst>
-                                  <p:childTnLst>
-                                    <p:animEffect transition="out" filter="wipe(down)">
-                                      <p:cBhvr>
-                                        <p:cTn id="6" dur="180" accel="50000">
-                                          <p:stCondLst>
-                                            <p:cond delay="1820"/>
-                                          </p:stCondLst>
-                                        </p:cTn>
-                                        <p:tgtEl>
-                                          <p:spTgt spid="4">
-                                            <p:txEl>
-                                              <p:pRg st="0" end="0"/>
-                                            </p:txEl>
-                                          </p:spTgt>
-                                        </p:tgtEl>
-                                      </p:cBhvr>
-                                    </p:animEffect>
-                                    <p:anim calcmode="lin" valueType="num">
-                                      <p:cBhvr>
-                                        <p:cTn id="7" dur="1822" tmFilter="0,0; 0.14,0.31; 0.43,0.73; 0.71,0.91; 1.0,1.0">
-                                          <p:stCondLst>
-                                            <p:cond delay="0"/>
-                                          </p:stCondLst>
-                                        </p:cTn>
-                                        <p:tgtEl>
-                                          <p:spTgt spid="4">
-                                            <p:txEl>
-                                              <p:pRg st="0" end="0"/>
-                                            </p:txEl>
-                                          </p:spTgt>
-                                        </p:tgtEl>
-                                        <p:attrNameLst>
-                                          <p:attrName>ppt_x</p:attrName>
-                                        </p:attrNameLst>
-                                      </p:cBhvr>
-                                      <p:tavLst>
-                                        <p:tav tm="0">
-                                          <p:val>
-                                            <p:strVal val="ppt_x"/>
-                                          </p:val>
-                                        </p:tav>
-                                        <p:tav tm="100000">
-                                          <p:val>
-                                            <p:strVal val="#ppt_x+0.25"/>
-                                          </p:val>
-                                        </p:tav>
-                                      </p:tavLst>
-                                    </p:anim>
-                                    <p:anim calcmode="lin" valueType="num">
-                                      <p:cBhvr>
-                                        <p:cTn id="8" dur="178">
-                                          <p:stCondLst>
-                                            <p:cond delay="1822"/>
-                                          </p:stCondLst>
-                                        </p:cTn>
-                                        <p:tgtEl>
-                                          <p:spTgt spid="4">
-                                            <p:txEl>
-                                              <p:pRg st="0" end="0"/>
-                                            </p:txEl>
-                                          </p:spTgt>
-                                        </p:tgtEl>
-                                        <p:attrNameLst>
-                                          <p:attrName>ppt_x</p:attrName>
-                                        </p:attrNameLst>
-                                      </p:cBhvr>
-                                      <p:tavLst>
-                                        <p:tav tm="0">
-                                          <p:val>
-                                            <p:strVal val="ppt_x"/>
-                                          </p:val>
-                                        </p:tav>
-                                        <p:tav tm="100000">
-                                          <p:val>
-                                            <p:strVal val="ppt_x"/>
-                                          </p:val>
-                                        </p:tav>
-                                      </p:tavLst>
-                                    </p:anim>
-                                    <p:anim calcmode="lin" valueType="num">
-                                      <p:cBhvr>
-                                        <p:cTn id="9" dur="664" tmFilter="0.0,0.0;0.25,0.07;0.50,0.2;0.75,0.467;1.0,1.0">
-                                          <p:stCondLst>
-                                            <p:cond delay="0"/>
-                                          </p:stCondLst>
-                                        </p:cTn>
-                                        <p:tgtEl>
-                                          <p:spTgt spid="4">
-                                            <p:txEl>
-                                              <p:pRg st="0" end="0"/>
-                                            </p:txEl>
-                                          </p:spTgt>
-                                        </p:tgtEl>
-                                        <p:attrNameLst>
-                                          <p:attrName>ppt_y</p:attrName>
-                                        </p:attrNameLst>
-                                      </p:cBhvr>
-                                      <p:tavLst>
-                                        <p:tav tm="0">
-                                          <p:val>
-                                            <p:strVal val="ppt_y"/>
-                                          </p:val>
-                                        </p:tav>
-                                        <p:tav tm="5000">
-                                          <p:val>
-                                            <p:strVal val="ppt_y+0.026"/>
-                                          </p:val>
-                                        </p:tav>
-                                        <p:tav tm="10000">
-                                          <p:val>
-                                            <p:strVal val="ppt_y+0.052"/>
-                                          </p:val>
-                                        </p:tav>
-                                        <p:tav tm="15000">
-                                          <p:val>
-                                            <p:strVal val="ppt_y+0.078"/>
-                                          </p:val>
-                                        </p:tav>
-                                        <p:tav tm="20000">
-                                          <p:val>
-                                            <p:strVal val="ppt_y+0.103"/>
-                                          </p:val>
-                                        </p:tav>
-                                        <p:tav tm="30000">
-                                          <p:val>
-                                            <p:strVal val="ppt_y+0.151"/>
-                                          </p:val>
-                                        </p:tav>
-                                        <p:tav tm="40000">
-                                          <p:val>
-                                            <p:strVal val="ppt_y+0.196"/>
-                                          </p:val>
-                                        </p:tav>
-                                        <p:tav tm="50000">
-                                          <p:val>
-                                            <p:strVal val="ppt_y+0.236"/>
-                                          </p:val>
-                                        </p:tav>
-                                        <p:tav tm="60000">
-                                          <p:val>
-                                            <p:strVal val="ppt_y+0.270"/>
-                                          </p:val>
-                                        </p:tav>
-                                        <p:tav tm="70000">
-                                          <p:val>
-                                            <p:strVal val="ppt_y+0.297"/>
-                                          </p:val>
-                                        </p:tav>
-                                        <p:tav tm="80000">
-                                          <p:val>
-                                            <p:strVal val="ppt_y+0.317"/>
-                                          </p:val>
-                                        </p:tav>
-                                        <p:tav tm="90000">
-                                          <p:val>
-                                            <p:strVal val="ppt_y+0.329"/>
-                                          </p:val>
-                                        </p:tav>
-                                        <p:tav tm="100000">
-                                          <p:val>
-                                            <p:strVal val="ppt_y+0.333"/>
-                                          </p:val>
-                                        </p:tav>
-                                      </p:tavLst>
-                                    </p:anim>
-                                    <p:anim calcmode="lin" valueType="num">
-                                      <p:cBhvr>
-                                        <p:cTn id="10" dur="664" tmFilter="0, 0; 0.125,0.2665; 0.25,0.4; 0.375,0.465; 0.5,0.5;  0.625,0.535; 0.75,0.6; 0.875,0.7335; 1,1">
-                                          <p:stCondLst>
-                                            <p:cond delay="664"/>
-                                          </p:stCondLst>
-                                        </p:cTn>
-                                        <p:tgtEl>
-                                          <p:spTgt spid="4">
-                                            <p:txEl>
-                                              <p:pRg st="0" end="0"/>
-                                            </p:txEl>
-                                          </p:spTgt>
-                                        </p:tgtEl>
-                                        <p:attrNameLst>
-                                          <p:attrName>ppt_y</p:attrName>
-                                        </p:attrNameLst>
-                                      </p:cBhvr>
-                                      <p:tavLst>
-                                        <p:tav tm="0">
-                                          <p:val>
-                                            <p:strVal val="ppt_y"/>
-                                          </p:val>
-                                        </p:tav>
-                                        <p:tav tm="10000">
-                                          <p:val>
-                                            <p:strVal val="ppt_y-0.034"/>
-                                          </p:val>
-                                        </p:tav>
-                                        <p:tav tm="20000">
-                                          <p:val>
-                                            <p:strVal val="ppt_y-0.065"/>
-                                          </p:val>
-                                        </p:tav>
-                                        <p:tav tm="30000">
-                                          <p:val>
-                                            <p:strVal val="ppt_y-0.090"/>
-                                          </p:val>
-                                        </p:tav>
-                                        <p:tav tm="40000">
-                                          <p:val>
-                                            <p:strVal val="ppt_y-0.106"/>
-                                          </p:val>
-                                        </p:tav>
-                                        <p:tav tm="50000">
-                                          <p:val>
-                                            <p:strVal val="ppt_y-0.111"/>
-                                          </p:val>
-                                        </p:tav>
-                                        <p:tav tm="60000">
-                                          <p:val>
-                                            <p:strVal val="ppt_y-0.106"/>
-                                          </p:val>
-                                        </p:tav>
-                                        <p:tav tm="70000">
-                                          <p:val>
-                                            <p:strVal val="ppt_y-0.090"/>
-                                          </p:val>
-                                        </p:tav>
-                                        <p:tav tm="80000">
-                                          <p:val>
-                                            <p:strVal val="ppt_y-0.065"/>
-                                          </p:val>
-                                        </p:tav>
-                                        <p:tav tm="90000">
-                                          <p:val>
-                                            <p:strVal val="ppt_y-0.034"/>
-                                          </p:val>
-                                        </p:tav>
-                                        <p:tav tm="100000">
-                                          <p:val>
-                                            <p:strVal val="ppt_y"/>
-                                          </p:val>
-                                        </p:tav>
-                                      </p:tavLst>
-                                    </p:anim>
-                                    <p:anim calcmode="lin" valueType="num">
-                                      <p:cBhvr>
-                                        <p:cTn id="11" dur="332" tmFilter="0, 0; 0.125,0.2665; 0.25,0.4; 0.375,0.465; 0.5,0.5;  0.625,0.535; 0.75,0.6; 0.875,0.7335; 1,1">
-                                          <p:stCondLst>
-                                            <p:cond delay="1324"/>
-                                          </p:stCondLst>
-                                        </p:cTn>
-                                        <p:tgtEl>
-                                          <p:spTgt spid="4">
-                                            <p:txEl>
-                                              <p:pRg st="0" end="0"/>
-                                            </p:txEl>
-                                          </p:spTgt>
-                                        </p:tgtEl>
-                                        <p:attrNameLst>
-                                          <p:attrName>ppt_y</p:attrName>
-                                        </p:attrNameLst>
-                                      </p:cBhvr>
-                                      <p:tavLst>
-                                        <p:tav tm="0">
-                                          <p:val>
-                                            <p:strVal val="ppt_y"/>
-                                          </p:val>
-                                        </p:tav>
-                                        <p:tav tm="10000">
-                                          <p:val>
-                                            <p:strVal val="ppt_y-0.011"/>
-                                          </p:val>
-                                        </p:tav>
-                                        <p:tav tm="20000">
-                                          <p:val>
-                                            <p:strVal val="ppt_y-0.022"/>
-                                          </p:val>
-                                        </p:tav>
-                                        <p:tav tm="30000">
-                                          <p:val>
-                                            <p:strVal val="ppt_y-0.030"/>
-                                          </p:val>
-                                        </p:tav>
-                                        <p:tav tm="40000">
-                                          <p:val>
-                                            <p:strVal val="ppt_y-0.035"/>
-                                          </p:val>
-                                        </p:tav>
-                                        <p:tav tm="50000">
-                                          <p:val>
-                                            <p:strVal val="ppt_y-0.037"/>
-                                          </p:val>
-                                        </p:tav>
-                                        <p:tav tm="60000">
-                                          <p:val>
-                                            <p:strVal val="ppt_y-0.035"/>
-                                          </p:val>
-                                        </p:tav>
-                                        <p:tav tm="70000">
-                                          <p:val>
-                                            <p:strVal val="ppt_y-0.030"/>
-                                          </p:val>
-                                        </p:tav>
-                                        <p:tav tm="80000">
-                                          <p:val>
-                                            <p:strVal val="ppt_y-0.022"/>
-                                          </p:val>
-                                        </p:tav>
-                                        <p:tav tm="90000">
-                                          <p:val>
-                                            <p:strVal val="ppt_y-0.011"/>
-                                          </p:val>
-                                        </p:tav>
-                                        <p:tav tm="100000">
-                                          <p:val>
-                                            <p:strVal val="ppt_y"/>
-                                          </p:val>
-                                        </p:tav>
-                                      </p:tavLst>
-                                    </p:anim>
-                                    <p:anim calcmode="lin" valueType="num">
-                                      <p:cBhvr>
-                                        <p:cTn id="12" dur="164" tmFilter="0, 0; 0.125,0.2665; 0.25,0.4; 0.375,0.465; 0.5,0.5;  0.625,0.535; 0.75,0.6; 0.875,0.7335; 1,1">
-                                          <p:stCondLst>
-                                            <p:cond delay="1656"/>
-                                          </p:stCondLst>
-                                        </p:cTn>
-                                        <p:tgtEl>
-                                          <p:spTgt spid="4">
-                                            <p:txEl>
-                                              <p:pRg st="0" end="0"/>
-                                            </p:txEl>
-                                          </p:spTgt>
-                                        </p:tgtEl>
-                                        <p:attrNameLst>
-                                          <p:attrName>ppt_y</p:attrName>
-                                        </p:attrNameLst>
-                                      </p:cBhvr>
-                                      <p:tavLst>
-                                        <p:tav tm="0">
-                                          <p:val>
-                                            <p:strVal val="ppt_y"/>
-                                          </p:val>
-                                        </p:tav>
-                                        <p:tav tm="10000">
-                                          <p:val>
-                                            <p:strVal val="ppt_y-0.004"/>
-                                          </p:val>
-                                        </p:tav>
-                                        <p:tav tm="20000">
-                                          <p:val>
-                                            <p:strVal val="ppt_y-0.007"/>
-                                          </p:val>
-                                        </p:tav>
-                                        <p:tav tm="30000">
-                                          <p:val>
-                                            <p:strVal val="ppt_y-0.010"/>
-                                          </p:val>
-                                        </p:tav>
-                                        <p:tav tm="40000">
-                                          <p:val>
-                                            <p:strVal val="ppt_y-0.012"/>
-                                          </p:val>
-                                        </p:tav>
-                                        <p:tav tm="50000">
-                                          <p:val>
-                                            <p:strVal val="ppt_y-0.0123"/>
-                                          </p:val>
-                                        </p:tav>
-                                        <p:tav tm="60000">
-                                          <p:val>
-                                            <p:strVal val="ppt_y-0.012"/>
-                                          </p:val>
-                                        </p:tav>
-                                        <p:tav tm="70000">
-                                          <p:val>
-                                            <p:strVal val="ppt_y-0.010"/>
-                                          </p:val>
-                                        </p:tav>
-                                        <p:tav tm="80000">
-                                          <p:val>
-                                            <p:strVal val="ppt_y-0.007"/>
-                                          </p:val>
-                                        </p:tav>
-                                        <p:tav tm="90000">
-                                          <p:val>
-                                            <p:strVal val="ppt_y-0.004"/>
-                                          </p:val>
-                                        </p:tav>
-                                        <p:tav tm="100000">
-                                          <p:val>
-                                            <p:strVal val="ppt_y"/>
-                                          </p:val>
-                                        </p:tav>
-                                      </p:tavLst>
-                                    </p:anim>
-                                    <p:anim calcmode="lin" valueType="num">
-                                      <p:cBhvr>
-                                        <p:cTn id="13" dur="180" accel="50000">
-                                          <p:stCondLst>
-                                            <p:cond delay="1820"/>
-                                          </p:stCondLst>
-                                        </p:cTn>
-                                        <p:tgtEl>
-                                          <p:spTgt spid="4">
-                                            <p:txEl>
-                                              <p:pRg st="0" end="0"/>
-                                            </p:txEl>
-                                          </p:spTgt>
-                                        </p:tgtEl>
-                                        <p:attrNameLst>
-                                          <p:attrName>ppt_y</p:attrName>
-                                        </p:attrNameLst>
-                                      </p:cBhvr>
-                                      <p:tavLst>
-                                        <p:tav tm="0">
-                                          <p:val>
-                                            <p:strVal val="ppt_y"/>
-                                          </p:val>
-                                        </p:tav>
-                                        <p:tav tm="100000">
-                                          <p:val>
-                                            <p:strVal val="ppt_y+ppt_h"/>
-                                          </p:val>
-                                        </p:tav>
-                                      </p:tavLst>
-                                    </p:anim>
-                                    <p:animScale>
-                                      <p:cBhvr>
-                                        <p:cTn id="14" dur="26">
-                                          <p:stCondLst>
-                                            <p:cond delay="620"/>
-                                          </p:stCondLst>
-                                        </p:cTn>
-                                        <p:tgtEl>
-                                          <p:spTgt spid="4">
-                                            <p:txEl>
-                                              <p:pRg st="0" end="0"/>
-                                            </p:txEl>
-                                          </p:spTgt>
-                                        </p:tgtEl>
-                                      </p:cBhvr>
-                                      <p:to x="100000" y="60000"/>
-                                    </p:animScale>
-                                    <p:animScale>
-                                      <p:cBhvr>
-                                        <p:cTn id="15" dur="166" decel="50000">
-                                          <p:stCondLst>
-                                            <p:cond delay="646"/>
-                                          </p:stCondLst>
-                                        </p:cTn>
-                                        <p:tgtEl>
-                                          <p:spTgt spid="4">
-                                            <p:txEl>
-                                              <p:pRg st="0" end="0"/>
-                                            </p:txEl>
-                                          </p:spTgt>
-                                        </p:tgtEl>
-                                      </p:cBhvr>
-                                      <p:to x="100000" y="100000"/>
-                                    </p:animScale>
-                                    <p:animScale>
-                                      <p:cBhvr>
-                                        <p:cTn id="16" dur="26">
-                                          <p:stCondLst>
-                                            <p:cond delay="1312"/>
-                                          </p:stCondLst>
-                                        </p:cTn>
-                                        <p:tgtEl>
-                                          <p:spTgt spid="4">
-                                            <p:txEl>
-                                              <p:pRg st="0" end="0"/>
-                                            </p:txEl>
-                                          </p:spTgt>
-                                        </p:tgtEl>
-                                      </p:cBhvr>
-                                      <p:to x="100000" y="80000"/>
-                                    </p:animScale>
-                                    <p:animScale>
-                                      <p:cBhvr>
-                                        <p:cTn id="17" dur="166" decel="50000">
-                                          <p:stCondLst>
-                                            <p:cond delay="1338"/>
-                                          </p:stCondLst>
-                                        </p:cTn>
-                                        <p:tgtEl>
-                                          <p:spTgt spid="4">
-                                            <p:txEl>
-                                              <p:pRg st="0" end="0"/>
-                                            </p:txEl>
-                                          </p:spTgt>
-                                        </p:tgtEl>
-                                      </p:cBhvr>
-                                      <p:to x="100000" y="100000"/>
-                                    </p:animScale>
-                                    <p:animScale>
-                                      <p:cBhvr>
-                                        <p:cTn id="18" dur="26">
-                                          <p:stCondLst>
-                                            <p:cond delay="1642"/>
-                                          </p:stCondLst>
-                                        </p:cTn>
-                                        <p:tgtEl>
-                                          <p:spTgt spid="4">
-                                            <p:txEl>
-                                              <p:pRg st="0" end="0"/>
-                                            </p:txEl>
-                                          </p:spTgt>
-                                        </p:tgtEl>
-                                      </p:cBhvr>
-                                      <p:to x="100000" y="90000"/>
-                                    </p:animScale>
-                                    <p:animScale>
-                                      <p:cBhvr>
-                                        <p:cTn id="19" dur="166" decel="50000">
-                                          <p:stCondLst>
-                                            <p:cond delay="1668"/>
-                                          </p:stCondLst>
-                                        </p:cTn>
-                                        <p:tgtEl>
-                                          <p:spTgt spid="4">
-                                            <p:txEl>
-                                              <p:pRg st="0" end="0"/>
-                                            </p:txEl>
-                                          </p:spTgt>
-                                        </p:tgtEl>
-                                      </p:cBhvr>
-                                      <p:to x="100000" y="100000"/>
-                                    </p:animScale>
-                                    <p:animScale>
-                                      <p:cBhvr>
-                                        <p:cTn id="20" dur="26">
-                                          <p:stCondLst>
-                                            <p:cond delay="1808"/>
-                                          </p:stCondLst>
-                                        </p:cTn>
-                                        <p:tgtEl>
-                                          <p:spTgt spid="4">
-                                            <p:txEl>
-                                              <p:pRg st="0" end="0"/>
-                                            </p:txEl>
-                                          </p:spTgt>
-                                        </p:tgtEl>
-                                      </p:cBhvr>
-                                      <p:to x="100000" y="95000"/>
-                                    </p:animScale>
-                                    <p:animScale>
-                                      <p:cBhvr>
-                                        <p:cTn id="21" dur="166" decel="50000">
-                                          <p:stCondLst>
-                                            <p:cond delay="1834"/>
-                                          </p:stCondLst>
-                                        </p:cTn>
-                                        <p:tgtEl>
-                                          <p:spTgt spid="4">
-                                            <p:txEl>
-                                              <p:pRg st="0" end="0"/>
-                                            </p:txEl>
-                                          </p:spTgt>
-                                        </p:tgtEl>
-                                      </p:cBhvr>
-                                      <p:to x="100000" y="100000"/>
-                                    </p:animScale>
-                                    <p:set>
-                                      <p:cBhvr>
-                                        <p:cTn id="22" dur="1" fill="hold">
-                                          <p:stCondLst>
-                                            <p:cond delay="1999"/>
-                                          </p:stCondLst>
-                                        </p:cTn>
-                                        <p:tgtEl>
-                                          <p:spTgt spid="4">
-                                            <p:txEl>
-                                              <p:pRg st="0" end="0"/>
-                                            </p:txEl>
-                                          </p:spTgt>
-                                        </p:tgtEl>
-                                        <p:attrNameLst>
-                                          <p:attrName>style.visibility</p:attrName>
-                                        </p:attrNameLst>
-                                      </p:cBhvr>
-                                      <p:to>
-                                        <p:strVal val="hidden"/>
-                                      </p:to>
-                                    </p:set>
-                                  </p:childTnLst>
-                                </p:cTn>
-                              </p:par>
-                            </p:childTnLst>
-                          </p:cTn>
-                        </p:par>
-                      </p:childTnLst>
-                    </p:cTn>
-                  </p:par>
-                </p:childTnLst>
-              </p:cTn>
-              <p:prevCondLst>
-                <p:cond evt="onPrev" delay="0">
-                  <p:tgtEl>
-                    <p:sldTgt/>
-                  </p:tgtEl>
-                </p:cond>
-              </p:prevCondLst>
-              <p:nextCondLst>
-                <p:cond evt="onNext" delay="0">
-                  <p:tgtEl>
-                    <p:sldTgt/>
-                  </p:tgtEl>
-                </p:cond>
-              </p:nextCondLst>
-            </p:seq>
-          </p:childTnLst>
-        </p:cTn>
-      </p:par>
-    </p:tnLst>
-  </p:timing>
 </p:sld>
 </file>
 
@@ -35446,9 +34850,6 @@
                     <p:cTn id="3" fill="hold">
                       <p:stCondLst>
                         <p:cond delay="indefinite"/>
-                        <p:cond evt="onBegin" delay="0">
-                          <p:tn val="2"/>
-                        </p:cond>
                       </p:stCondLst>
                       <p:childTnLst>
                         <p:par>
@@ -35458,13 +34859,10 @@
                             </p:stCondLst>
                             <p:childTnLst>
                               <p:par>
-                                <p:cTn id="5" presetID="10" presetClass="entr" presetSubtype="0" fill="hold" grpId="0" nodeType="withEffect">
+                                <p:cTn id="5" presetID="10" presetClass="entr" presetSubtype="0" fill="hold" nodeType="clickEffect">
                                   <p:stCondLst>
-                                    <p:cond delay="1000"/>
+                                    <p:cond delay="0"/>
                                   </p:stCondLst>
-                                  <p:iterate>
-                                    <p:tmPct val="10000"/>
-                                  </p:iterate>
                                   <p:childTnLst>
                                     <p:set>
                                       <p:cBhvr>
@@ -35474,7 +34872,11 @@
                                           </p:stCondLst>
                                         </p:cTn>
                                         <p:tgtEl>
-                                          <p:spTgt spid="7"/>
+                                          <p:spTgt spid="8">
+                                            <p:txEl>
+                                              <p:pRg st="0" end="0"/>
+                                            </p:txEl>
+                                          </p:spTgt>
                                         </p:tgtEl>
                                         <p:attrNameLst>
                                           <p:attrName>style.visibility</p:attrName>
@@ -35486,9 +34888,13 @@
                                     </p:set>
                                     <p:animEffect transition="in" filter="fade">
                                       <p:cBhvr>
-                                        <p:cTn id="7" dur="700"/>
+                                        <p:cTn id="7" dur="500"/>
                                         <p:tgtEl>
-                                          <p:spTgt spid="7"/>
+                                          <p:spTgt spid="8">
+                                            <p:txEl>
+                                              <p:pRg st="0" end="0"/>
+                                            </p:txEl>
+                                          </p:spTgt>
                                         </p:tgtEl>
                                       </p:cBhvr>
                                     </p:animEffect>
@@ -35522,9 +34928,6 @@
         </p:cTn>
       </p:par>
     </p:tnLst>
-    <p:bldLst>
-      <p:bldP spid="7" grpId="0"/>
-    </p:bldLst>
   </p:timing>
 </p:sld>
 </file>
@@ -35854,14 +35257,6 @@
 </file>
 
 <file path=customXml/item2.xml><?xml version="1.0" encoding="utf-8"?>
-<p:properties xmlns:p="http://schemas.microsoft.com/office/2006/metadata/properties" xmlns:xsi="http://www.w3.org/2001/XMLSchema-instance" xmlns:pc="http://schemas.microsoft.com/office/infopath/2007/PartnerControls">
-  <documentManagement>
-    <_activity xmlns="0abcd5ae-8ee0-47d4-a59a-00240398246c" xsi:nil="true"/>
-  </documentManagement>
-</p:properties>
-</file>
-
-<file path=customXml/item3.xml><?xml version="1.0" encoding="utf-8"?>
 <ct:contentTypeSchema xmlns:ct="http://schemas.microsoft.com/office/2006/metadata/contentType" xmlns:ma="http://schemas.microsoft.com/office/2006/metadata/properties/metaAttributes" ct:_="" ma:_="" ma:contentTypeName="Document" ma:contentTypeID="0x0101000AC29F5E522E95488674DF393038BD99" ma:contentTypeVersion="8" ma:contentTypeDescription="Create a new document." ma:contentTypeScope="" ma:versionID="c971bdd218ba9101507c33cc582fe21c">
   <xsd:schema xmlns:xsd="http://www.w3.org/2001/XMLSchema" xmlns:xs="http://www.w3.org/2001/XMLSchema" xmlns:p="http://schemas.microsoft.com/office/2006/metadata/properties" xmlns:ns3="0abcd5ae-8ee0-47d4-a59a-00240398246c" xmlns:ns4="fc9ab629-8c1e-4e9f-a27d-21af9543d17f" targetNamespace="http://schemas.microsoft.com/office/2006/metadata/properties" ma:root="true" ma:fieldsID="094da82251913ddf886ea8a6050ea058" ns3:_="" ns4:_="">
     <xsd:import namespace="0abcd5ae-8ee0-47d4-a59a-00240398246c"/>
@@ -36050,6 +35445,14 @@
 </ct:contentTypeSchema>
 </file>
 
+<file path=customXml/item3.xml><?xml version="1.0" encoding="utf-8"?>
+<p:properties xmlns:p="http://schemas.microsoft.com/office/2006/metadata/properties" xmlns:xsi="http://www.w3.org/2001/XMLSchema-instance" xmlns:pc="http://schemas.microsoft.com/office/infopath/2007/PartnerControls">
+  <documentManagement>
+    <_activity xmlns="0abcd5ae-8ee0-47d4-a59a-00240398246c" xsi:nil="true"/>
+  </documentManagement>
+</p:properties>
+</file>
+
 <file path=customXml/itemProps1.xml><?xml version="1.0" encoding="utf-8"?>
 <ds:datastoreItem xmlns:ds="http://schemas.openxmlformats.org/officeDocument/2006/customXml" ds:itemID="{7ED4AF3E-9DCC-4D14-9582-5516E789E05E}">
   <ds:schemaRefs>
@@ -36059,23 +35462,6 @@
 </file>
 
 <file path=customXml/itemProps2.xml><?xml version="1.0" encoding="utf-8"?>
-<ds:datastoreItem xmlns:ds="http://schemas.openxmlformats.org/officeDocument/2006/customXml" ds:itemID="{048E1343-CD6C-4CFD-B13D-83861E52DF5B}">
-  <ds:schemaRefs>
-    <ds:schemaRef ds:uri="http://schemas.microsoft.com/office/2006/metadata/properties"/>
-    <ds:schemaRef ds:uri="http://schemas.microsoft.com/office/2006/documentManagement/types"/>
-    <ds:schemaRef ds:uri="0abcd5ae-8ee0-47d4-a59a-00240398246c"/>
-    <ds:schemaRef ds:uri="http://purl.org/dc/elements/1.1/"/>
-    <ds:schemaRef ds:uri="http://schemas.openxmlformats.org/package/2006/metadata/core-properties"/>
-    <ds:schemaRef ds:uri="fc9ab629-8c1e-4e9f-a27d-21af9543d17f"/>
-    <ds:schemaRef ds:uri="http://schemas.microsoft.com/office/infopath/2007/PartnerControls"/>
-    <ds:schemaRef ds:uri="http://www.w3.org/XML/1998/namespace"/>
-    <ds:schemaRef ds:uri="http://purl.org/dc/dcmitype/"/>
-    <ds:schemaRef ds:uri="http://purl.org/dc/terms/"/>
-  </ds:schemaRefs>
-</ds:datastoreItem>
-</file>
-
-<file path=customXml/itemProps3.xml><?xml version="1.0" encoding="utf-8"?>
 <ds:datastoreItem xmlns:ds="http://schemas.openxmlformats.org/officeDocument/2006/customXml" ds:itemID="{B0139F82-E3AA-44C2-B504-75EB3DAFD4D9}">
   <ds:schemaRefs>
     <ds:schemaRef ds:uri="http://schemas.microsoft.com/office/2006/metadata/contentType"/>
@@ -36092,4 +35478,21 @@
     <ds:schemaRef ds:uri="http://schemas.microsoft.com/internal/obd"/>
   </ds:schemaRefs>
 </ds:datastoreItem>
+</file>
+
+<file path=customXml/itemProps3.xml><?xml version="1.0" encoding="utf-8"?>
+<ds:datastoreItem xmlns:ds="http://schemas.openxmlformats.org/officeDocument/2006/customXml" ds:itemID="{048E1343-CD6C-4CFD-B13D-83861E52DF5B}">
+  <ds:schemaRefs>
+    <ds:schemaRef ds:uri="http://schemas.microsoft.com/office/2006/metadata/properties"/>
+    <ds:schemaRef ds:uri="http://schemas.microsoft.com/office/2006/documentManagement/types"/>
+    <ds:schemaRef ds:uri="0abcd5ae-8ee0-47d4-a59a-00240398246c"/>
+    <ds:schemaRef ds:uri="http://purl.org/dc/elements/1.1/"/>
+    <ds:schemaRef ds:uri="http://schemas.openxmlformats.org/package/2006/metadata/core-properties"/>
+    <ds:schemaRef ds:uri="fc9ab629-8c1e-4e9f-a27d-21af9543d17f"/>
+    <ds:schemaRef ds:uri="http://schemas.microsoft.com/office/infopath/2007/PartnerControls"/>
+    <ds:schemaRef ds:uri="http://www.w3.org/XML/1998/namespace"/>
+    <ds:schemaRef ds:uri="http://purl.org/dc/dcmitype/"/>
+    <ds:schemaRef ds:uri="http://purl.org/dc/terms/"/>
+  </ds:schemaRefs>
+</ds:datastoreItem>
 </file>
</xml_diff>